<commit_message>
License issues solved and it is good to go
</commit_message>
<xml_diff>
--- a/msOffice/AMarenaPresMall.pptx
+++ b/msOffice/AMarenaPresMall.pptx
@@ -1,20 +1,120 @@
 
 <file path=ppt/presentation.xml><?xml version="1.0" encoding="utf-8"?>
-<p:presentation xmlns:a="http://schemas.openxmlformats.org/drawingml/2006/main" xmlns:p="http://schemas.openxmlformats.org/presentationml/2006/main" xmlns:r="http://schemas.openxmlformats.org/officeDocument/2006/relationships" xmlns:p14="http://schemas.microsoft.com/office/powerpoint/2010/main" xmlns:p15="http://schemas.microsoft.com/office/powerpoint/2012/main" xmlns:mc="http://schemas.openxmlformats.org/markup-compatibility/2006">
+<p:presentation xmlns:a="http://schemas.openxmlformats.org/drawingml/2006/main" xmlns:r="http://schemas.openxmlformats.org/officeDocument/2006/relationships" xmlns:p="http://schemas.openxmlformats.org/presentationml/2006/main">
   <p:sldMasterIdLst>
-    <p:sldMasterId id="2147483648" r:id="rId2"/>
+    <p:sldMasterId id="2147483648" r:id="rId1"/>
   </p:sldMasterIdLst>
   <p:sldIdLst>
-    <p:sldId id="256" r:id="rId3"/>
-    <p:sldId id="257" r:id="rId4"/>
+    <p:sldId id="256" r:id="rId2"/>
+    <p:sldId id="259" r:id="rId3"/>
   </p:sldIdLst>
   <p:sldSz cx="10080625" cy="5670550"/>
-  <p:notesSz cx="7559675" cy="10691812"/>
+  <p:notesSz cx="7559675" cy="10691813"/>
+  <p:defaultTextStyle>
+    <a:defPPr>
+      <a:defRPr lang="sv-SE"/>
+    </a:defPPr>
+    <a:lvl1pPr marL="0" algn="l" defTabSz="914400" rtl="0" eaLnBrk="1" latinLnBrk="0" hangingPunct="1">
+      <a:defRPr sz="1800" kern="1200">
+        <a:solidFill>
+          <a:schemeClr val="tx1"/>
+        </a:solidFill>
+        <a:latin typeface="+mn-lt"/>
+        <a:ea typeface="+mn-ea"/>
+        <a:cs typeface="+mn-cs"/>
+      </a:defRPr>
+    </a:lvl1pPr>
+    <a:lvl2pPr marL="457200" algn="l" defTabSz="914400" rtl="0" eaLnBrk="1" latinLnBrk="0" hangingPunct="1">
+      <a:defRPr sz="1800" kern="1200">
+        <a:solidFill>
+          <a:schemeClr val="tx1"/>
+        </a:solidFill>
+        <a:latin typeface="+mn-lt"/>
+        <a:ea typeface="+mn-ea"/>
+        <a:cs typeface="+mn-cs"/>
+      </a:defRPr>
+    </a:lvl2pPr>
+    <a:lvl3pPr marL="914400" algn="l" defTabSz="914400" rtl="0" eaLnBrk="1" latinLnBrk="0" hangingPunct="1">
+      <a:defRPr sz="1800" kern="1200">
+        <a:solidFill>
+          <a:schemeClr val="tx1"/>
+        </a:solidFill>
+        <a:latin typeface="+mn-lt"/>
+        <a:ea typeface="+mn-ea"/>
+        <a:cs typeface="+mn-cs"/>
+      </a:defRPr>
+    </a:lvl3pPr>
+    <a:lvl4pPr marL="1371600" algn="l" defTabSz="914400" rtl="0" eaLnBrk="1" latinLnBrk="0" hangingPunct="1">
+      <a:defRPr sz="1800" kern="1200">
+        <a:solidFill>
+          <a:schemeClr val="tx1"/>
+        </a:solidFill>
+        <a:latin typeface="+mn-lt"/>
+        <a:ea typeface="+mn-ea"/>
+        <a:cs typeface="+mn-cs"/>
+      </a:defRPr>
+    </a:lvl4pPr>
+    <a:lvl5pPr marL="1828800" algn="l" defTabSz="914400" rtl="0" eaLnBrk="1" latinLnBrk="0" hangingPunct="1">
+      <a:defRPr sz="1800" kern="1200">
+        <a:solidFill>
+          <a:schemeClr val="tx1"/>
+        </a:solidFill>
+        <a:latin typeface="+mn-lt"/>
+        <a:ea typeface="+mn-ea"/>
+        <a:cs typeface="+mn-cs"/>
+      </a:defRPr>
+    </a:lvl5pPr>
+    <a:lvl6pPr marL="2286000" algn="l" defTabSz="914400" rtl="0" eaLnBrk="1" latinLnBrk="0" hangingPunct="1">
+      <a:defRPr sz="1800" kern="1200">
+        <a:solidFill>
+          <a:schemeClr val="tx1"/>
+        </a:solidFill>
+        <a:latin typeface="+mn-lt"/>
+        <a:ea typeface="+mn-ea"/>
+        <a:cs typeface="+mn-cs"/>
+      </a:defRPr>
+    </a:lvl6pPr>
+    <a:lvl7pPr marL="2743200" algn="l" defTabSz="914400" rtl="0" eaLnBrk="1" latinLnBrk="0" hangingPunct="1">
+      <a:defRPr sz="1800" kern="1200">
+        <a:solidFill>
+          <a:schemeClr val="tx1"/>
+        </a:solidFill>
+        <a:latin typeface="+mn-lt"/>
+        <a:ea typeface="+mn-ea"/>
+        <a:cs typeface="+mn-cs"/>
+      </a:defRPr>
+    </a:lvl7pPr>
+    <a:lvl8pPr marL="3200400" algn="l" defTabSz="914400" rtl="0" eaLnBrk="1" latinLnBrk="0" hangingPunct="1">
+      <a:defRPr sz="1800" kern="1200">
+        <a:solidFill>
+          <a:schemeClr val="tx1"/>
+        </a:solidFill>
+        <a:latin typeface="+mn-lt"/>
+        <a:ea typeface="+mn-ea"/>
+        <a:cs typeface="+mn-cs"/>
+      </a:defRPr>
+    </a:lvl8pPr>
+    <a:lvl9pPr marL="3657600" algn="l" defTabSz="914400" rtl="0" eaLnBrk="1" latinLnBrk="0" hangingPunct="1">
+      <a:defRPr sz="1800" kern="1200">
+        <a:solidFill>
+          <a:schemeClr val="tx1"/>
+        </a:solidFill>
+        <a:latin typeface="+mn-lt"/>
+        <a:ea typeface="+mn-ea"/>
+        <a:cs typeface="+mn-cs"/>
+      </a:defRPr>
+    </a:lvl9pPr>
+  </p:defaultTextStyle>
+  <p:extLst>
+    <p:ext uri="{EFAFB233-063F-42B5-8137-9DF3F51BA10A}">
+      <p15:sldGuideLst xmlns:p15="http://schemas.microsoft.com/office/powerpoint/2012/main"/>
+    </p:ext>
+  </p:extLst>
 </p:presentation>
 </file>
 
 <file path=ppt/slideLayouts/slideLayout1.xml><?xml version="1.0" encoding="utf-8"?>
-<p:sldLayout xmlns:a="http://schemas.openxmlformats.org/drawingml/2006/main" xmlns:p="http://schemas.openxmlformats.org/presentationml/2006/main" xmlns:r="http://schemas.openxmlformats.org/officeDocument/2006/relationships" xmlns:p14="http://schemas.microsoft.com/office/powerpoint/2010/main" xmlns:p15="http://schemas.microsoft.com/office/powerpoint/2012/main" xmlns:mc="http://schemas.openxmlformats.org/markup-compatibility/2006" type="blank" preserve="1">
+<p:sldLayout xmlns:a="http://schemas.openxmlformats.org/drawingml/2006/main" xmlns:r="http://schemas.openxmlformats.org/officeDocument/2006/relationships" xmlns:p="http://schemas.openxmlformats.org/presentationml/2006/main" type="blank" preserve="1">
   <p:cSld name="Blank Slide">
     <p:spTree>
       <p:nvGrpSpPr>
@@ -32,11 +132,14 @@
       </p:grpSpPr>
     </p:spTree>
   </p:cSld>
+  <p:clrMapOvr>
+    <a:masterClrMapping/>
+  </p:clrMapOvr>
 </p:sldLayout>
 </file>
 
 <file path=ppt/slideLayouts/slideLayout10.xml><?xml version="1.0" encoding="utf-8"?>
-<p:sldLayout xmlns:a="http://schemas.openxmlformats.org/drawingml/2006/main" xmlns:p="http://schemas.openxmlformats.org/presentationml/2006/main" xmlns:r="http://schemas.openxmlformats.org/officeDocument/2006/relationships" xmlns:p14="http://schemas.microsoft.com/office/powerpoint/2010/main" xmlns:p15="http://schemas.microsoft.com/office/powerpoint/2012/main" xmlns:mc="http://schemas.openxmlformats.org/markup-compatibility/2006" type="objOverTx" preserve="1">
+<p:sldLayout xmlns:a="http://schemas.openxmlformats.org/drawingml/2006/main" xmlns:r="http://schemas.openxmlformats.org/officeDocument/2006/relationships" xmlns:p="http://schemas.openxmlformats.org/presentationml/2006/main" type="objOverTx" preserve="1">
   <p:cSld name="Title, Content over Content">
     <p:spTree>
       <p:nvGrpSpPr>
@@ -72,11 +175,12 @@
           </a:prstGeom>
         </p:spPr>
         <p:txBody>
-          <a:bodyPr lIns="0" rIns="0" tIns="0" bIns="0" anchor="ctr"/>
-          <a:p>
-            <a:endParaRPr b="1" lang="sv-SE" sz="2200" spc="-1" strike="noStrike">
+          <a:bodyPr lIns="0" tIns="0" rIns="0" bIns="0" anchor="ctr"/>
+          <a:lstStyle/>
+          <a:p>
+            <a:endParaRPr lang="sv-SE" sz="2200" b="1" strike="noStrike" spc="-1">
               <a:solidFill>
-                <a:srgbClr val="656f6f"/>
+                <a:srgbClr val="656F6F"/>
               </a:solidFill>
               <a:latin typeface="Verdana"/>
             </a:endParaRPr>
@@ -103,11 +207,12 @@
           </a:prstGeom>
         </p:spPr>
         <p:txBody>
-          <a:bodyPr lIns="0" rIns="0" tIns="0" bIns="0">
-            <a:normAutofit/>
-          </a:bodyPr>
-          <a:p>
-            <a:endParaRPr b="1" lang="sv-SE" sz="1800" spc="-1" strike="noStrike">
+          <a:bodyPr lIns="0" tIns="0" rIns="0" bIns="0">
+            <a:normAutofit/>
+          </a:bodyPr>
+          <a:lstStyle/>
+          <a:p>
+            <a:endParaRPr lang="sv-SE" sz="1800" b="1" strike="noStrike" spc="-1">
               <a:latin typeface="Verdana"/>
             </a:endParaRPr>
           </a:p>
@@ -133,11 +238,12 @@
           </a:prstGeom>
         </p:spPr>
         <p:txBody>
-          <a:bodyPr lIns="0" rIns="0" tIns="0" bIns="0">
-            <a:normAutofit/>
-          </a:bodyPr>
-          <a:p>
-            <a:endParaRPr b="1" lang="sv-SE" sz="1800" spc="-1" strike="noStrike">
+          <a:bodyPr lIns="0" tIns="0" rIns="0" bIns="0">
+            <a:normAutofit/>
+          </a:bodyPr>
+          <a:lstStyle/>
+          <a:p>
+            <a:endParaRPr lang="sv-SE" sz="1800" b="1" strike="noStrike" spc="-1">
               <a:latin typeface="Verdana"/>
             </a:endParaRPr>
           </a:p>
@@ -145,11 +251,14 @@
       </p:sp>
     </p:spTree>
   </p:cSld>
+  <p:clrMapOvr>
+    <a:masterClrMapping/>
+  </p:clrMapOvr>
 </p:sldLayout>
 </file>
 
 <file path=ppt/slideLayouts/slideLayout11.xml><?xml version="1.0" encoding="utf-8"?>
-<p:sldLayout xmlns:a="http://schemas.openxmlformats.org/drawingml/2006/main" xmlns:p="http://schemas.openxmlformats.org/presentationml/2006/main" xmlns:r="http://schemas.openxmlformats.org/officeDocument/2006/relationships" xmlns:p14="http://schemas.microsoft.com/office/powerpoint/2010/main" xmlns:p15="http://schemas.microsoft.com/office/powerpoint/2012/main" xmlns:mc="http://schemas.openxmlformats.org/markup-compatibility/2006" type="fourObj" preserve="1">
+<p:sldLayout xmlns:a="http://schemas.openxmlformats.org/drawingml/2006/main" xmlns:r="http://schemas.openxmlformats.org/officeDocument/2006/relationships" xmlns:p="http://schemas.openxmlformats.org/presentationml/2006/main" type="fourObj" preserve="1">
   <p:cSld name="Title, 4 Content">
     <p:spTree>
       <p:nvGrpSpPr>
@@ -185,11 +294,12 @@
           </a:prstGeom>
         </p:spPr>
         <p:txBody>
-          <a:bodyPr lIns="0" rIns="0" tIns="0" bIns="0" anchor="ctr"/>
-          <a:p>
-            <a:endParaRPr b="1" lang="sv-SE" sz="2200" spc="-1" strike="noStrike">
+          <a:bodyPr lIns="0" tIns="0" rIns="0" bIns="0" anchor="ctr"/>
+          <a:lstStyle/>
+          <a:p>
+            <a:endParaRPr lang="sv-SE" sz="2200" b="1" strike="noStrike" spc="-1">
               <a:solidFill>
-                <a:srgbClr val="656f6f"/>
+                <a:srgbClr val="656F6F"/>
               </a:solidFill>
               <a:latin typeface="Verdana"/>
             </a:endParaRPr>
@@ -216,11 +326,12 @@
           </a:prstGeom>
         </p:spPr>
         <p:txBody>
-          <a:bodyPr lIns="0" rIns="0" tIns="0" bIns="0">
-            <a:normAutofit/>
-          </a:bodyPr>
-          <a:p>
-            <a:endParaRPr b="1" lang="sv-SE" sz="1800" spc="-1" strike="noStrike">
+          <a:bodyPr lIns="0" tIns="0" rIns="0" bIns="0">
+            <a:normAutofit/>
+          </a:bodyPr>
+          <a:lstStyle/>
+          <a:p>
+            <a:endParaRPr lang="sv-SE" sz="1800" b="1" strike="noStrike" spc="-1">
               <a:latin typeface="Verdana"/>
             </a:endParaRPr>
           </a:p>
@@ -246,11 +357,12 @@
           </a:prstGeom>
         </p:spPr>
         <p:txBody>
-          <a:bodyPr lIns="0" rIns="0" tIns="0" bIns="0">
-            <a:normAutofit/>
-          </a:bodyPr>
-          <a:p>
-            <a:endParaRPr b="1" lang="sv-SE" sz="1800" spc="-1" strike="noStrike">
+          <a:bodyPr lIns="0" tIns="0" rIns="0" bIns="0">
+            <a:normAutofit/>
+          </a:bodyPr>
+          <a:lstStyle/>
+          <a:p>
+            <a:endParaRPr lang="sv-SE" sz="1800" b="1" strike="noStrike" spc="-1">
               <a:latin typeface="Verdana"/>
             </a:endParaRPr>
           </a:p>
@@ -276,11 +388,12 @@
           </a:prstGeom>
         </p:spPr>
         <p:txBody>
-          <a:bodyPr lIns="0" rIns="0" tIns="0" bIns="0">
-            <a:normAutofit/>
-          </a:bodyPr>
-          <a:p>
-            <a:endParaRPr b="1" lang="sv-SE" sz="1800" spc="-1" strike="noStrike">
+          <a:bodyPr lIns="0" tIns="0" rIns="0" bIns="0">
+            <a:normAutofit/>
+          </a:bodyPr>
+          <a:lstStyle/>
+          <a:p>
+            <a:endParaRPr lang="sv-SE" sz="1800" b="1" strike="noStrike" spc="-1">
               <a:latin typeface="Verdana"/>
             </a:endParaRPr>
           </a:p>
@@ -306,11 +419,12 @@
           </a:prstGeom>
         </p:spPr>
         <p:txBody>
-          <a:bodyPr lIns="0" rIns="0" tIns="0" bIns="0">
-            <a:normAutofit/>
-          </a:bodyPr>
-          <a:p>
-            <a:endParaRPr b="1" lang="sv-SE" sz="1800" spc="-1" strike="noStrike">
+          <a:bodyPr lIns="0" tIns="0" rIns="0" bIns="0">
+            <a:normAutofit/>
+          </a:bodyPr>
+          <a:lstStyle/>
+          <a:p>
+            <a:endParaRPr lang="sv-SE" sz="1800" b="1" strike="noStrike" spc="-1">
               <a:latin typeface="Verdana"/>
             </a:endParaRPr>
           </a:p>
@@ -318,11 +432,14 @@
       </p:sp>
     </p:spTree>
   </p:cSld>
+  <p:clrMapOvr>
+    <a:masterClrMapping/>
+  </p:clrMapOvr>
 </p:sldLayout>
 </file>
 
 <file path=ppt/slideLayouts/slideLayout12.xml><?xml version="1.0" encoding="utf-8"?>
-<p:sldLayout xmlns:a="http://schemas.openxmlformats.org/drawingml/2006/main" xmlns:p="http://schemas.openxmlformats.org/presentationml/2006/main" xmlns:r="http://schemas.openxmlformats.org/officeDocument/2006/relationships" xmlns:p14="http://schemas.microsoft.com/office/powerpoint/2010/main" xmlns:p15="http://schemas.microsoft.com/office/powerpoint/2012/main" xmlns:mc="http://schemas.openxmlformats.org/markup-compatibility/2006" type="blank" preserve="1">
+<p:sldLayout xmlns:a="http://schemas.openxmlformats.org/drawingml/2006/main" xmlns:r="http://schemas.openxmlformats.org/officeDocument/2006/relationships" xmlns:p="http://schemas.openxmlformats.org/presentationml/2006/main" type="blank" preserve="1">
   <p:cSld name="Title, 6 Content">
     <p:spTree>
       <p:nvGrpSpPr>
@@ -358,11 +475,12 @@
           </a:prstGeom>
         </p:spPr>
         <p:txBody>
-          <a:bodyPr lIns="0" rIns="0" tIns="0" bIns="0" anchor="ctr"/>
-          <a:p>
-            <a:endParaRPr b="1" lang="sv-SE" sz="2200" spc="-1" strike="noStrike">
+          <a:bodyPr lIns="0" tIns="0" rIns="0" bIns="0" anchor="ctr"/>
+          <a:lstStyle/>
+          <a:p>
+            <a:endParaRPr lang="sv-SE" sz="2200" b="1" strike="noStrike" spc="-1">
               <a:solidFill>
-                <a:srgbClr val="656f6f"/>
+                <a:srgbClr val="656F6F"/>
               </a:solidFill>
               <a:latin typeface="Verdana"/>
             </a:endParaRPr>
@@ -389,11 +507,12 @@
           </a:prstGeom>
         </p:spPr>
         <p:txBody>
-          <a:bodyPr lIns="0" rIns="0" tIns="0" bIns="0">
-            <a:normAutofit/>
-          </a:bodyPr>
-          <a:p>
-            <a:endParaRPr b="1" lang="sv-SE" sz="1800" spc="-1" strike="noStrike">
+          <a:bodyPr lIns="0" tIns="0" rIns="0" bIns="0">
+            <a:normAutofit/>
+          </a:bodyPr>
+          <a:lstStyle/>
+          <a:p>
+            <a:endParaRPr lang="sv-SE" sz="1800" b="1" strike="noStrike" spc="-1">
               <a:latin typeface="Verdana"/>
             </a:endParaRPr>
           </a:p>
@@ -419,11 +538,12 @@
           </a:prstGeom>
         </p:spPr>
         <p:txBody>
-          <a:bodyPr lIns="0" rIns="0" tIns="0" bIns="0">
-            <a:normAutofit/>
-          </a:bodyPr>
-          <a:p>
-            <a:endParaRPr b="1" lang="sv-SE" sz="1800" spc="-1" strike="noStrike">
+          <a:bodyPr lIns="0" tIns="0" rIns="0" bIns="0">
+            <a:normAutofit/>
+          </a:bodyPr>
+          <a:lstStyle/>
+          <a:p>
+            <a:endParaRPr lang="sv-SE" sz="1800" b="1" strike="noStrike" spc="-1">
               <a:latin typeface="Verdana"/>
             </a:endParaRPr>
           </a:p>
@@ -449,11 +569,12 @@
           </a:prstGeom>
         </p:spPr>
         <p:txBody>
-          <a:bodyPr lIns="0" rIns="0" tIns="0" bIns="0">
-            <a:normAutofit/>
-          </a:bodyPr>
-          <a:p>
-            <a:endParaRPr b="1" lang="sv-SE" sz="1800" spc="-1" strike="noStrike">
+          <a:bodyPr lIns="0" tIns="0" rIns="0" bIns="0">
+            <a:normAutofit/>
+          </a:bodyPr>
+          <a:lstStyle/>
+          <a:p>
+            <a:endParaRPr lang="sv-SE" sz="1800" b="1" strike="noStrike" spc="-1">
               <a:latin typeface="Verdana"/>
             </a:endParaRPr>
           </a:p>
@@ -479,11 +600,12 @@
           </a:prstGeom>
         </p:spPr>
         <p:txBody>
-          <a:bodyPr lIns="0" rIns="0" tIns="0" bIns="0">
-            <a:normAutofit/>
-          </a:bodyPr>
-          <a:p>
-            <a:endParaRPr b="1" lang="sv-SE" sz="1800" spc="-1" strike="noStrike">
+          <a:bodyPr lIns="0" tIns="0" rIns="0" bIns="0">
+            <a:normAutofit/>
+          </a:bodyPr>
+          <a:lstStyle/>
+          <a:p>
+            <a:endParaRPr lang="sv-SE" sz="1800" b="1" strike="noStrike" spc="-1">
               <a:latin typeface="Verdana"/>
             </a:endParaRPr>
           </a:p>
@@ -509,11 +631,12 @@
           </a:prstGeom>
         </p:spPr>
         <p:txBody>
-          <a:bodyPr lIns="0" rIns="0" tIns="0" bIns="0">
-            <a:normAutofit/>
-          </a:bodyPr>
-          <a:p>
-            <a:endParaRPr b="1" lang="sv-SE" sz="1800" spc="-1" strike="noStrike">
+          <a:bodyPr lIns="0" tIns="0" rIns="0" bIns="0">
+            <a:normAutofit/>
+          </a:bodyPr>
+          <a:lstStyle/>
+          <a:p>
+            <a:endParaRPr lang="sv-SE" sz="1800" b="1" strike="noStrike" spc="-1">
               <a:latin typeface="Verdana"/>
             </a:endParaRPr>
           </a:p>
@@ -539,11 +662,12 @@
           </a:prstGeom>
         </p:spPr>
         <p:txBody>
-          <a:bodyPr lIns="0" rIns="0" tIns="0" bIns="0">
-            <a:normAutofit/>
-          </a:bodyPr>
-          <a:p>
-            <a:endParaRPr b="1" lang="sv-SE" sz="1800" spc="-1" strike="noStrike">
+          <a:bodyPr lIns="0" tIns="0" rIns="0" bIns="0">
+            <a:normAutofit/>
+          </a:bodyPr>
+          <a:lstStyle/>
+          <a:p>
+            <a:endParaRPr lang="sv-SE" sz="1800" b="1" strike="noStrike" spc="-1">
               <a:latin typeface="Verdana"/>
             </a:endParaRPr>
           </a:p>
@@ -551,11 +675,14 @@
       </p:sp>
     </p:spTree>
   </p:cSld>
+  <p:clrMapOvr>
+    <a:masterClrMapping/>
+  </p:clrMapOvr>
 </p:sldLayout>
 </file>
 
 <file path=ppt/slideLayouts/slideLayout2.xml><?xml version="1.0" encoding="utf-8"?>
-<p:sldLayout xmlns:a="http://schemas.openxmlformats.org/drawingml/2006/main" xmlns:p="http://schemas.openxmlformats.org/presentationml/2006/main" xmlns:r="http://schemas.openxmlformats.org/officeDocument/2006/relationships" xmlns:p14="http://schemas.microsoft.com/office/powerpoint/2010/main" xmlns:p15="http://schemas.microsoft.com/office/powerpoint/2012/main" xmlns:mc="http://schemas.openxmlformats.org/markup-compatibility/2006" type="tx" preserve="1">
+<p:sldLayout xmlns:a="http://schemas.openxmlformats.org/drawingml/2006/main" xmlns:r="http://schemas.openxmlformats.org/officeDocument/2006/relationships" xmlns:p="http://schemas.openxmlformats.org/presentationml/2006/main" type="tx" preserve="1">
   <p:cSld name="Title Slide">
     <p:spTree>
       <p:nvGrpSpPr>
@@ -591,11 +718,12 @@
           </a:prstGeom>
         </p:spPr>
         <p:txBody>
-          <a:bodyPr lIns="0" rIns="0" tIns="0" bIns="0" anchor="ctr"/>
-          <a:p>
-            <a:endParaRPr b="1" lang="sv-SE" sz="2200" spc="-1" strike="noStrike">
+          <a:bodyPr lIns="0" tIns="0" rIns="0" bIns="0" anchor="ctr"/>
+          <a:lstStyle/>
+          <a:p>
+            <a:endParaRPr lang="sv-SE" sz="2200" b="1" strike="noStrike" spc="-1">
               <a:solidFill>
-                <a:srgbClr val="656f6f"/>
+                <a:srgbClr val="656F6F"/>
               </a:solidFill>
               <a:latin typeface="Verdana"/>
             </a:endParaRPr>
@@ -622,12 +750,13 @@
           </a:prstGeom>
         </p:spPr>
         <p:txBody>
-          <a:bodyPr lIns="0" rIns="0" tIns="0" bIns="0" anchor="ctr"/>
+          <a:bodyPr lIns="0" tIns="0" rIns="0" bIns="0" anchor="ctr"/>
+          <a:lstStyle/>
           <a:p>
             <a:pPr algn="ctr"/>
-            <a:endParaRPr b="1" lang="sv-SE" sz="2200" spc="-1" strike="noStrike">
+            <a:endParaRPr lang="sv-SE" sz="2200" b="1" strike="noStrike" spc="-1">
               <a:solidFill>
-                <a:srgbClr val="656f6f"/>
+                <a:srgbClr val="656F6F"/>
               </a:solidFill>
               <a:latin typeface="Verdana"/>
             </a:endParaRPr>
@@ -636,11 +765,14 @@
       </p:sp>
     </p:spTree>
   </p:cSld>
+  <p:clrMapOvr>
+    <a:masterClrMapping/>
+  </p:clrMapOvr>
 </p:sldLayout>
 </file>
 
 <file path=ppt/slideLayouts/slideLayout3.xml><?xml version="1.0" encoding="utf-8"?>
-<p:sldLayout xmlns:a="http://schemas.openxmlformats.org/drawingml/2006/main" xmlns:p="http://schemas.openxmlformats.org/presentationml/2006/main" xmlns:r="http://schemas.openxmlformats.org/officeDocument/2006/relationships" xmlns:p14="http://schemas.microsoft.com/office/powerpoint/2010/main" xmlns:p15="http://schemas.microsoft.com/office/powerpoint/2012/main" xmlns:mc="http://schemas.openxmlformats.org/markup-compatibility/2006" type="obj" preserve="1">
+<p:sldLayout xmlns:a="http://schemas.openxmlformats.org/drawingml/2006/main" xmlns:r="http://schemas.openxmlformats.org/officeDocument/2006/relationships" xmlns:p="http://schemas.openxmlformats.org/presentationml/2006/main" type="obj" preserve="1">
   <p:cSld name="Title, Content">
     <p:spTree>
       <p:nvGrpSpPr>
@@ -676,11 +808,12 @@
           </a:prstGeom>
         </p:spPr>
         <p:txBody>
-          <a:bodyPr lIns="0" rIns="0" tIns="0" bIns="0" anchor="ctr"/>
-          <a:p>
-            <a:endParaRPr b="1" lang="sv-SE" sz="2200" spc="-1" strike="noStrike">
+          <a:bodyPr lIns="0" tIns="0" rIns="0" bIns="0" anchor="ctr"/>
+          <a:lstStyle/>
+          <a:p>
+            <a:endParaRPr lang="sv-SE" sz="2200" b="1" strike="noStrike" spc="-1">
               <a:solidFill>
-                <a:srgbClr val="656f6f"/>
+                <a:srgbClr val="656F6F"/>
               </a:solidFill>
               <a:latin typeface="Verdana"/>
             </a:endParaRPr>
@@ -707,11 +840,12 @@
           </a:prstGeom>
         </p:spPr>
         <p:txBody>
-          <a:bodyPr lIns="0" rIns="0" tIns="0" bIns="0">
-            <a:normAutofit/>
-          </a:bodyPr>
-          <a:p>
-            <a:endParaRPr b="1" lang="sv-SE" sz="1800" spc="-1" strike="noStrike">
+          <a:bodyPr lIns="0" tIns="0" rIns="0" bIns="0">
+            <a:normAutofit/>
+          </a:bodyPr>
+          <a:lstStyle/>
+          <a:p>
+            <a:endParaRPr lang="sv-SE" sz="1800" b="1" strike="noStrike" spc="-1">
               <a:latin typeface="Verdana"/>
             </a:endParaRPr>
           </a:p>
@@ -719,11 +853,14 @@
       </p:sp>
     </p:spTree>
   </p:cSld>
+  <p:clrMapOvr>
+    <a:masterClrMapping/>
+  </p:clrMapOvr>
 </p:sldLayout>
 </file>
 
 <file path=ppt/slideLayouts/slideLayout4.xml><?xml version="1.0" encoding="utf-8"?>
-<p:sldLayout xmlns:a="http://schemas.openxmlformats.org/drawingml/2006/main" xmlns:p="http://schemas.openxmlformats.org/presentationml/2006/main" xmlns:r="http://schemas.openxmlformats.org/officeDocument/2006/relationships" xmlns:p14="http://schemas.microsoft.com/office/powerpoint/2010/main" xmlns:p15="http://schemas.microsoft.com/office/powerpoint/2012/main" xmlns:mc="http://schemas.openxmlformats.org/markup-compatibility/2006" type="twoObj" preserve="1">
+<p:sldLayout xmlns:a="http://schemas.openxmlformats.org/drawingml/2006/main" xmlns:r="http://schemas.openxmlformats.org/officeDocument/2006/relationships" xmlns:p="http://schemas.openxmlformats.org/presentationml/2006/main" type="twoObj" preserve="1">
   <p:cSld name="Title, 2 Content">
     <p:spTree>
       <p:nvGrpSpPr>
@@ -759,11 +896,12 @@
           </a:prstGeom>
         </p:spPr>
         <p:txBody>
-          <a:bodyPr lIns="0" rIns="0" tIns="0" bIns="0" anchor="ctr"/>
-          <a:p>
-            <a:endParaRPr b="1" lang="sv-SE" sz="2200" spc="-1" strike="noStrike">
+          <a:bodyPr lIns="0" tIns="0" rIns="0" bIns="0" anchor="ctr"/>
+          <a:lstStyle/>
+          <a:p>
+            <a:endParaRPr lang="sv-SE" sz="2200" b="1" strike="noStrike" spc="-1">
               <a:solidFill>
-                <a:srgbClr val="656f6f"/>
+                <a:srgbClr val="656F6F"/>
               </a:solidFill>
               <a:latin typeface="Verdana"/>
             </a:endParaRPr>
@@ -790,11 +928,12 @@
           </a:prstGeom>
         </p:spPr>
         <p:txBody>
-          <a:bodyPr lIns="0" rIns="0" tIns="0" bIns="0">
-            <a:normAutofit/>
-          </a:bodyPr>
-          <a:p>
-            <a:endParaRPr b="1" lang="sv-SE" sz="1800" spc="-1" strike="noStrike">
+          <a:bodyPr lIns="0" tIns="0" rIns="0" bIns="0">
+            <a:normAutofit/>
+          </a:bodyPr>
+          <a:lstStyle/>
+          <a:p>
+            <a:endParaRPr lang="sv-SE" sz="1800" b="1" strike="noStrike" spc="-1">
               <a:latin typeface="Verdana"/>
             </a:endParaRPr>
           </a:p>
@@ -820,11 +959,12 @@
           </a:prstGeom>
         </p:spPr>
         <p:txBody>
-          <a:bodyPr lIns="0" rIns="0" tIns="0" bIns="0">
-            <a:normAutofit/>
-          </a:bodyPr>
-          <a:p>
-            <a:endParaRPr b="1" lang="sv-SE" sz="1800" spc="-1" strike="noStrike">
+          <a:bodyPr lIns="0" tIns="0" rIns="0" bIns="0">
+            <a:normAutofit/>
+          </a:bodyPr>
+          <a:lstStyle/>
+          <a:p>
+            <a:endParaRPr lang="sv-SE" sz="1800" b="1" strike="noStrike" spc="-1">
               <a:latin typeface="Verdana"/>
             </a:endParaRPr>
           </a:p>
@@ -832,11 +972,14 @@
       </p:sp>
     </p:spTree>
   </p:cSld>
+  <p:clrMapOvr>
+    <a:masterClrMapping/>
+  </p:clrMapOvr>
 </p:sldLayout>
 </file>
 
 <file path=ppt/slideLayouts/slideLayout5.xml><?xml version="1.0" encoding="utf-8"?>
-<p:sldLayout xmlns:a="http://schemas.openxmlformats.org/drawingml/2006/main" xmlns:p="http://schemas.openxmlformats.org/presentationml/2006/main" xmlns:r="http://schemas.openxmlformats.org/officeDocument/2006/relationships" xmlns:p14="http://schemas.microsoft.com/office/powerpoint/2010/main" xmlns:p15="http://schemas.microsoft.com/office/powerpoint/2012/main" xmlns:mc="http://schemas.openxmlformats.org/markup-compatibility/2006" type="titleOnly" preserve="1">
+<p:sldLayout xmlns:a="http://schemas.openxmlformats.org/drawingml/2006/main" xmlns:r="http://schemas.openxmlformats.org/officeDocument/2006/relationships" xmlns:p="http://schemas.openxmlformats.org/presentationml/2006/main" type="titleOnly" preserve="1">
   <p:cSld name="Title Only">
     <p:spTree>
       <p:nvGrpSpPr>
@@ -872,11 +1015,12 @@
           </a:prstGeom>
         </p:spPr>
         <p:txBody>
-          <a:bodyPr lIns="0" rIns="0" tIns="0" bIns="0" anchor="ctr"/>
-          <a:p>
-            <a:endParaRPr b="1" lang="sv-SE" sz="2200" spc="-1" strike="noStrike">
+          <a:bodyPr lIns="0" tIns="0" rIns="0" bIns="0" anchor="ctr"/>
+          <a:lstStyle/>
+          <a:p>
+            <a:endParaRPr lang="sv-SE" sz="2200" b="1" strike="noStrike" spc="-1">
               <a:solidFill>
-                <a:srgbClr val="656f6f"/>
+                <a:srgbClr val="656F6F"/>
               </a:solidFill>
               <a:latin typeface="Verdana"/>
             </a:endParaRPr>
@@ -885,11 +1029,14 @@
       </p:sp>
     </p:spTree>
   </p:cSld>
+  <p:clrMapOvr>
+    <a:masterClrMapping/>
+  </p:clrMapOvr>
 </p:sldLayout>
 </file>
 
 <file path=ppt/slideLayouts/slideLayout6.xml><?xml version="1.0" encoding="utf-8"?>
-<p:sldLayout xmlns:a="http://schemas.openxmlformats.org/drawingml/2006/main" xmlns:p="http://schemas.openxmlformats.org/presentationml/2006/main" xmlns:r="http://schemas.openxmlformats.org/officeDocument/2006/relationships" xmlns:p14="http://schemas.microsoft.com/office/powerpoint/2010/main" xmlns:p15="http://schemas.microsoft.com/office/powerpoint/2012/main" xmlns:mc="http://schemas.openxmlformats.org/markup-compatibility/2006" type="objOnly" preserve="1">
+<p:sldLayout xmlns:a="http://schemas.openxmlformats.org/drawingml/2006/main" xmlns:r="http://schemas.openxmlformats.org/officeDocument/2006/relationships" xmlns:p="http://schemas.openxmlformats.org/presentationml/2006/main" type="objOnly" preserve="1">
   <p:cSld name="Centered Text">
     <p:spTree>
       <p:nvGrpSpPr>
@@ -925,12 +1072,13 @@
           </a:prstGeom>
         </p:spPr>
         <p:txBody>
-          <a:bodyPr lIns="0" rIns="0" tIns="0" bIns="0" anchor="ctr"/>
+          <a:bodyPr lIns="0" tIns="0" rIns="0" bIns="0" anchor="ctr"/>
+          <a:lstStyle/>
           <a:p>
             <a:pPr algn="ctr"/>
-            <a:endParaRPr b="1" lang="sv-SE" sz="2200" spc="-1" strike="noStrike">
+            <a:endParaRPr lang="sv-SE" sz="2200" b="1" strike="noStrike" spc="-1">
               <a:solidFill>
-                <a:srgbClr val="656f6f"/>
+                <a:srgbClr val="656F6F"/>
               </a:solidFill>
               <a:latin typeface="Verdana"/>
             </a:endParaRPr>
@@ -939,11 +1087,14 @@
       </p:sp>
     </p:spTree>
   </p:cSld>
+  <p:clrMapOvr>
+    <a:masterClrMapping/>
+  </p:clrMapOvr>
 </p:sldLayout>
 </file>
 
 <file path=ppt/slideLayouts/slideLayout7.xml><?xml version="1.0" encoding="utf-8"?>
-<p:sldLayout xmlns:a="http://schemas.openxmlformats.org/drawingml/2006/main" xmlns:p="http://schemas.openxmlformats.org/presentationml/2006/main" xmlns:r="http://schemas.openxmlformats.org/officeDocument/2006/relationships" xmlns:p14="http://schemas.microsoft.com/office/powerpoint/2010/main" xmlns:p15="http://schemas.microsoft.com/office/powerpoint/2012/main" xmlns:mc="http://schemas.openxmlformats.org/markup-compatibility/2006" type="twoObjAndObj" preserve="1">
+<p:sldLayout xmlns:a="http://schemas.openxmlformats.org/drawingml/2006/main" xmlns:r="http://schemas.openxmlformats.org/officeDocument/2006/relationships" xmlns:p="http://schemas.openxmlformats.org/presentationml/2006/main" type="twoObjAndObj" preserve="1">
   <p:cSld name="Title, 2 Content and Content">
     <p:spTree>
       <p:nvGrpSpPr>
@@ -979,11 +1130,12 @@
           </a:prstGeom>
         </p:spPr>
         <p:txBody>
-          <a:bodyPr lIns="0" rIns="0" tIns="0" bIns="0" anchor="ctr"/>
-          <a:p>
-            <a:endParaRPr b="1" lang="sv-SE" sz="2200" spc="-1" strike="noStrike">
+          <a:bodyPr lIns="0" tIns="0" rIns="0" bIns="0" anchor="ctr"/>
+          <a:lstStyle/>
+          <a:p>
+            <a:endParaRPr lang="sv-SE" sz="2200" b="1" strike="noStrike" spc="-1">
               <a:solidFill>
-                <a:srgbClr val="656f6f"/>
+                <a:srgbClr val="656F6F"/>
               </a:solidFill>
               <a:latin typeface="Verdana"/>
             </a:endParaRPr>
@@ -1010,11 +1162,12 @@
           </a:prstGeom>
         </p:spPr>
         <p:txBody>
-          <a:bodyPr lIns="0" rIns="0" tIns="0" bIns="0">
-            <a:normAutofit/>
-          </a:bodyPr>
-          <a:p>
-            <a:endParaRPr b="1" lang="sv-SE" sz="1800" spc="-1" strike="noStrike">
+          <a:bodyPr lIns="0" tIns="0" rIns="0" bIns="0">
+            <a:normAutofit/>
+          </a:bodyPr>
+          <a:lstStyle/>
+          <a:p>
+            <a:endParaRPr lang="sv-SE" sz="1800" b="1" strike="noStrike" spc="-1">
               <a:latin typeface="Verdana"/>
             </a:endParaRPr>
           </a:p>
@@ -1040,11 +1193,12 @@
           </a:prstGeom>
         </p:spPr>
         <p:txBody>
-          <a:bodyPr lIns="0" rIns="0" tIns="0" bIns="0">
-            <a:normAutofit/>
-          </a:bodyPr>
-          <a:p>
-            <a:endParaRPr b="1" lang="sv-SE" sz="1800" spc="-1" strike="noStrike">
+          <a:bodyPr lIns="0" tIns="0" rIns="0" bIns="0">
+            <a:normAutofit/>
+          </a:bodyPr>
+          <a:lstStyle/>
+          <a:p>
+            <a:endParaRPr lang="sv-SE" sz="1800" b="1" strike="noStrike" spc="-1">
               <a:latin typeface="Verdana"/>
             </a:endParaRPr>
           </a:p>
@@ -1070,11 +1224,12 @@
           </a:prstGeom>
         </p:spPr>
         <p:txBody>
-          <a:bodyPr lIns="0" rIns="0" tIns="0" bIns="0">
-            <a:normAutofit/>
-          </a:bodyPr>
-          <a:p>
-            <a:endParaRPr b="1" lang="sv-SE" sz="1800" spc="-1" strike="noStrike">
+          <a:bodyPr lIns="0" tIns="0" rIns="0" bIns="0">
+            <a:normAutofit/>
+          </a:bodyPr>
+          <a:lstStyle/>
+          <a:p>
+            <a:endParaRPr lang="sv-SE" sz="1800" b="1" strike="noStrike" spc="-1">
               <a:latin typeface="Verdana"/>
             </a:endParaRPr>
           </a:p>
@@ -1082,11 +1237,14 @@
       </p:sp>
     </p:spTree>
   </p:cSld>
+  <p:clrMapOvr>
+    <a:masterClrMapping/>
+  </p:clrMapOvr>
 </p:sldLayout>
 </file>
 
 <file path=ppt/slideLayouts/slideLayout8.xml><?xml version="1.0" encoding="utf-8"?>
-<p:sldLayout xmlns:a="http://schemas.openxmlformats.org/drawingml/2006/main" xmlns:p="http://schemas.openxmlformats.org/presentationml/2006/main" xmlns:r="http://schemas.openxmlformats.org/officeDocument/2006/relationships" xmlns:p14="http://schemas.microsoft.com/office/powerpoint/2010/main" xmlns:p15="http://schemas.microsoft.com/office/powerpoint/2012/main" xmlns:mc="http://schemas.openxmlformats.org/markup-compatibility/2006" type="objAndTwoObj" preserve="1">
+<p:sldLayout xmlns:a="http://schemas.openxmlformats.org/drawingml/2006/main" xmlns:r="http://schemas.openxmlformats.org/officeDocument/2006/relationships" xmlns:p="http://schemas.openxmlformats.org/presentationml/2006/main" type="objAndTwoObj" preserve="1">
   <p:cSld name="Title Content and 2 Content">
     <p:spTree>
       <p:nvGrpSpPr>
@@ -1122,11 +1280,12 @@
           </a:prstGeom>
         </p:spPr>
         <p:txBody>
-          <a:bodyPr lIns="0" rIns="0" tIns="0" bIns="0" anchor="ctr"/>
-          <a:p>
-            <a:endParaRPr b="1" lang="sv-SE" sz="2200" spc="-1" strike="noStrike">
+          <a:bodyPr lIns="0" tIns="0" rIns="0" bIns="0" anchor="ctr"/>
+          <a:lstStyle/>
+          <a:p>
+            <a:endParaRPr lang="sv-SE" sz="2200" b="1" strike="noStrike" spc="-1">
               <a:solidFill>
-                <a:srgbClr val="656f6f"/>
+                <a:srgbClr val="656F6F"/>
               </a:solidFill>
               <a:latin typeface="Verdana"/>
             </a:endParaRPr>
@@ -1153,11 +1312,12 @@
           </a:prstGeom>
         </p:spPr>
         <p:txBody>
-          <a:bodyPr lIns="0" rIns="0" tIns="0" bIns="0">
-            <a:normAutofit/>
-          </a:bodyPr>
-          <a:p>
-            <a:endParaRPr b="1" lang="sv-SE" sz="1800" spc="-1" strike="noStrike">
+          <a:bodyPr lIns="0" tIns="0" rIns="0" bIns="0">
+            <a:normAutofit/>
+          </a:bodyPr>
+          <a:lstStyle/>
+          <a:p>
+            <a:endParaRPr lang="sv-SE" sz="1800" b="1" strike="noStrike" spc="-1">
               <a:latin typeface="Verdana"/>
             </a:endParaRPr>
           </a:p>
@@ -1183,11 +1343,12 @@
           </a:prstGeom>
         </p:spPr>
         <p:txBody>
-          <a:bodyPr lIns="0" rIns="0" tIns="0" bIns="0">
-            <a:normAutofit/>
-          </a:bodyPr>
-          <a:p>
-            <a:endParaRPr b="1" lang="sv-SE" sz="1800" spc="-1" strike="noStrike">
+          <a:bodyPr lIns="0" tIns="0" rIns="0" bIns="0">
+            <a:normAutofit/>
+          </a:bodyPr>
+          <a:lstStyle/>
+          <a:p>
+            <a:endParaRPr lang="sv-SE" sz="1800" b="1" strike="noStrike" spc="-1">
               <a:latin typeface="Verdana"/>
             </a:endParaRPr>
           </a:p>
@@ -1213,11 +1374,12 @@
           </a:prstGeom>
         </p:spPr>
         <p:txBody>
-          <a:bodyPr lIns="0" rIns="0" tIns="0" bIns="0">
-            <a:normAutofit/>
-          </a:bodyPr>
-          <a:p>
-            <a:endParaRPr b="1" lang="sv-SE" sz="1800" spc="-1" strike="noStrike">
+          <a:bodyPr lIns="0" tIns="0" rIns="0" bIns="0">
+            <a:normAutofit/>
+          </a:bodyPr>
+          <a:lstStyle/>
+          <a:p>
+            <a:endParaRPr lang="sv-SE" sz="1800" b="1" strike="noStrike" spc="-1">
               <a:latin typeface="Verdana"/>
             </a:endParaRPr>
           </a:p>
@@ -1225,11 +1387,14 @@
       </p:sp>
     </p:spTree>
   </p:cSld>
+  <p:clrMapOvr>
+    <a:masterClrMapping/>
+  </p:clrMapOvr>
 </p:sldLayout>
 </file>
 
 <file path=ppt/slideLayouts/slideLayout9.xml><?xml version="1.0" encoding="utf-8"?>
-<p:sldLayout xmlns:a="http://schemas.openxmlformats.org/drawingml/2006/main" xmlns:p="http://schemas.openxmlformats.org/presentationml/2006/main" xmlns:r="http://schemas.openxmlformats.org/officeDocument/2006/relationships" xmlns:p14="http://schemas.microsoft.com/office/powerpoint/2010/main" xmlns:p15="http://schemas.microsoft.com/office/powerpoint/2012/main" xmlns:mc="http://schemas.openxmlformats.org/markup-compatibility/2006" type="twoObjOverTx" preserve="1">
+<p:sldLayout xmlns:a="http://schemas.openxmlformats.org/drawingml/2006/main" xmlns:r="http://schemas.openxmlformats.org/officeDocument/2006/relationships" xmlns:p="http://schemas.openxmlformats.org/presentationml/2006/main" type="twoObjOverTx" preserve="1">
   <p:cSld name="Title, 2 Content over Content">
     <p:spTree>
       <p:nvGrpSpPr>
@@ -1265,11 +1430,12 @@
           </a:prstGeom>
         </p:spPr>
         <p:txBody>
-          <a:bodyPr lIns="0" rIns="0" tIns="0" bIns="0" anchor="ctr"/>
-          <a:p>
-            <a:endParaRPr b="1" lang="sv-SE" sz="2200" spc="-1" strike="noStrike">
+          <a:bodyPr lIns="0" tIns="0" rIns="0" bIns="0" anchor="ctr"/>
+          <a:lstStyle/>
+          <a:p>
+            <a:endParaRPr lang="sv-SE" sz="2200" b="1" strike="noStrike" spc="-1">
               <a:solidFill>
-                <a:srgbClr val="656f6f"/>
+                <a:srgbClr val="656F6F"/>
               </a:solidFill>
               <a:latin typeface="Verdana"/>
             </a:endParaRPr>
@@ -1296,11 +1462,12 @@
           </a:prstGeom>
         </p:spPr>
         <p:txBody>
-          <a:bodyPr lIns="0" rIns="0" tIns="0" bIns="0">
-            <a:normAutofit/>
-          </a:bodyPr>
-          <a:p>
-            <a:endParaRPr b="1" lang="sv-SE" sz="1800" spc="-1" strike="noStrike">
+          <a:bodyPr lIns="0" tIns="0" rIns="0" bIns="0">
+            <a:normAutofit/>
+          </a:bodyPr>
+          <a:lstStyle/>
+          <a:p>
+            <a:endParaRPr lang="sv-SE" sz="1800" b="1" strike="noStrike" spc="-1">
               <a:latin typeface="Verdana"/>
             </a:endParaRPr>
           </a:p>
@@ -1326,11 +1493,12 @@
           </a:prstGeom>
         </p:spPr>
         <p:txBody>
-          <a:bodyPr lIns="0" rIns="0" tIns="0" bIns="0">
-            <a:normAutofit/>
-          </a:bodyPr>
-          <a:p>
-            <a:endParaRPr b="1" lang="sv-SE" sz="1800" spc="-1" strike="noStrike">
+          <a:bodyPr lIns="0" tIns="0" rIns="0" bIns="0">
+            <a:normAutofit/>
+          </a:bodyPr>
+          <a:lstStyle/>
+          <a:p>
+            <a:endParaRPr lang="sv-SE" sz="1800" b="1" strike="noStrike" spc="-1">
               <a:latin typeface="Verdana"/>
             </a:endParaRPr>
           </a:p>
@@ -1356,11 +1524,12 @@
           </a:prstGeom>
         </p:spPr>
         <p:txBody>
-          <a:bodyPr lIns="0" rIns="0" tIns="0" bIns="0">
-            <a:normAutofit/>
-          </a:bodyPr>
-          <a:p>
-            <a:endParaRPr b="1" lang="sv-SE" sz="1800" spc="-1" strike="noStrike">
+          <a:bodyPr lIns="0" tIns="0" rIns="0" bIns="0">
+            <a:normAutofit/>
+          </a:bodyPr>
+          <a:lstStyle/>
+          <a:p>
+            <a:endParaRPr lang="sv-SE" sz="1800" b="1" strike="noStrike" spc="-1">
               <a:latin typeface="Verdana"/>
             </a:endParaRPr>
           </a:p>
@@ -1368,20 +1537,24 @@
       </p:sp>
     </p:spTree>
   </p:cSld>
+  <p:clrMapOvr>
+    <a:masterClrMapping/>
+  </p:clrMapOvr>
 </p:sldLayout>
 </file>
 
 <file path=ppt/slideMasters/slideMaster1.xml><?xml version="1.0" encoding="utf-8"?>
-<p:sldMaster xmlns:a="http://schemas.openxmlformats.org/drawingml/2006/main" xmlns:p="http://schemas.openxmlformats.org/presentationml/2006/main" xmlns:r="http://schemas.openxmlformats.org/officeDocument/2006/relationships" xmlns:p14="http://schemas.microsoft.com/office/powerpoint/2010/main" xmlns:p15="http://schemas.microsoft.com/office/powerpoint/2012/main" xmlns:mc="http://schemas.openxmlformats.org/markup-compatibility/2006">
+<p:sldMaster xmlns:a="http://schemas.openxmlformats.org/drawingml/2006/main" xmlns:r="http://schemas.openxmlformats.org/officeDocument/2006/relationships" xmlns:p="http://schemas.openxmlformats.org/presentationml/2006/main">
   <p:cSld>
     <p:bg>
       <p:bgPr>
         <a:blipFill rotWithShape="0">
-          <a:blip r:embed="rId2"/>
+          <a:blip r:embed="rId14"/>
           <a:stretch>
             <a:fillRect/>
           </a:stretch>
         </a:blipFill>
+        <a:effectLst/>
       </p:bgPr>
     </p:bg>
     <p:spTree>
@@ -1400,7 +1573,7 @@
       </p:grpSpPr>
       <p:sp>
         <p:nvSpPr>
-          <p:cNvPr id="0" name="PlaceHolder 1"/>
+          <p:cNvPr id="3" name="PlaceHolder 1"/>
           <p:cNvSpPr>
             <a:spLocks noGrp="1"/>
           </p:cNvSpPr>
@@ -1418,29 +1591,24 @@
           </a:prstGeom>
         </p:spPr>
         <p:txBody>
-          <a:bodyPr lIns="0" rIns="0" tIns="0" bIns="0" anchor="ctr"/>
+          <a:bodyPr lIns="0" tIns="0" rIns="0" bIns="0" anchor="ctr"/>
+          <a:lstStyle/>
           <a:p>
             <a:r>
-              <a:rPr b="1" lang="sv-SE" sz="2200" spc="-1" strike="noStrike">
+              <a:rPr lang="sv-SE" sz="2200" b="1" strike="noStrike" spc="-1">
                 <a:solidFill>
-                  <a:srgbClr val="656f6f"/>
+                  <a:srgbClr val="656F6F"/>
                 </a:solidFill>
                 <a:latin typeface="Verdana"/>
               </a:rPr>
               <a:t>Click to edit the title text format</a:t>
             </a:r>
-            <a:endParaRPr b="1" lang="sv-SE" sz="2200" spc="-1" strike="noStrike">
-              <a:solidFill>
-                <a:srgbClr val="656f6f"/>
-              </a:solidFill>
-              <a:latin typeface="Verdana"/>
-            </a:endParaRPr>
-          </a:p>
-        </p:txBody>
-      </p:sp>
-      <p:sp>
-        <p:nvSpPr>
-          <p:cNvPr id="1" name="PlaceHolder 2"/>
+          </a:p>
+        </p:txBody>
+      </p:sp>
+      <p:sp>
+        <p:nvSpPr>
+          <p:cNvPr id="4" name="PlaceHolder 2"/>
           <p:cNvSpPr>
             <a:spLocks noGrp="1"/>
           </p:cNvSpPr>
@@ -1458,9 +1626,10 @@
           </a:prstGeom>
         </p:spPr>
         <p:txBody>
-          <a:bodyPr lIns="0" rIns="0" tIns="0" bIns="0">
-            <a:normAutofit/>
-          </a:bodyPr>
+          <a:bodyPr lIns="0" tIns="0" rIns="0" bIns="0">
+            <a:normAutofit/>
+          </a:bodyPr>
+          <a:lstStyle/>
           <a:p>
             <a:pPr marL="432000" indent="-324000">
               <a:spcBef>
@@ -1474,17 +1643,14 @@
               <a:buChar char=""/>
             </a:pPr>
             <a:r>
-              <a:rPr b="1" lang="sv-SE" sz="1800" spc="-1" strike="noStrike">
+              <a:rPr lang="sv-SE" sz="1800" b="1" strike="noStrike" spc="-1">
                 <a:latin typeface="Verdana"/>
               </a:rPr>
               <a:t>Click to edit the outline text format</a:t>
             </a:r>
-            <a:endParaRPr b="1" lang="sv-SE" sz="1800" spc="-1" strike="noStrike">
-              <a:latin typeface="Verdana"/>
-            </a:endParaRPr>
-          </a:p>
-          <a:p>
-            <a:pPr lvl="1" marL="864000" indent="-324000">
+          </a:p>
+          <a:p>
+            <a:pPr marL="864000" lvl="1" indent="-324000">
               <a:spcBef>
                 <a:spcPts val="1134"/>
               </a:spcBef>
@@ -1496,17 +1662,14 @@
               <a:buChar char=""/>
             </a:pPr>
             <a:r>
-              <a:rPr b="0" lang="sv-SE" sz="1800" spc="-1" strike="noStrike">
+              <a:rPr lang="sv-SE" sz="1800" b="0" strike="noStrike" spc="-1">
                 <a:latin typeface="Verdana"/>
               </a:rPr>
               <a:t>Second Outline Level</a:t>
             </a:r>
-            <a:endParaRPr b="0" lang="sv-SE" sz="1800" spc="-1" strike="noStrike">
-              <a:latin typeface="Verdana"/>
-            </a:endParaRPr>
-          </a:p>
-          <a:p>
-            <a:pPr lvl="2" marL="1296000" indent="-288000">
+          </a:p>
+          <a:p>
+            <a:pPr marL="1296000" lvl="2" indent="-288000">
               <a:spcBef>
                 <a:spcPts val="850"/>
               </a:spcBef>
@@ -1518,17 +1681,14 @@
               <a:buChar char=""/>
             </a:pPr>
             <a:r>
-              <a:rPr b="0" lang="sv-SE" sz="1600" spc="-1" strike="noStrike">
+              <a:rPr lang="sv-SE" sz="1600" b="0" strike="noStrike" spc="-1">
                 <a:latin typeface="Verdana"/>
               </a:rPr>
               <a:t>Third Outline Level</a:t>
             </a:r>
-            <a:endParaRPr b="0" lang="sv-SE" sz="1600" spc="-1" strike="noStrike">
-              <a:latin typeface="Verdana"/>
-            </a:endParaRPr>
-          </a:p>
-          <a:p>
-            <a:pPr lvl="3" marL="1728000" indent="-216000">
+          </a:p>
+          <a:p>
+            <a:pPr marL="1728000" lvl="3" indent="-216000">
               <a:spcBef>
                 <a:spcPts val="567"/>
               </a:spcBef>
@@ -1540,17 +1700,14 @@
               <a:buChar char=""/>
             </a:pPr>
             <a:r>
-              <a:rPr b="0" lang="sv-SE" sz="1400" spc="-1" strike="noStrike">
+              <a:rPr lang="sv-SE" sz="1400" b="0" strike="noStrike" spc="-1">
                 <a:latin typeface="Verdana"/>
               </a:rPr>
               <a:t>Fourth Outline Level</a:t>
             </a:r>
-            <a:endParaRPr b="0" lang="sv-SE" sz="1400" spc="-1" strike="noStrike">
-              <a:latin typeface="Verdana"/>
-            </a:endParaRPr>
-          </a:p>
-          <a:p>
-            <a:pPr lvl="4" marL="2160000" indent="-216000">
+          </a:p>
+          <a:p>
+            <a:pPr marL="2160000" lvl="4" indent="-216000">
               <a:spcBef>
                 <a:spcPts val="283"/>
               </a:spcBef>
@@ -1562,17 +1719,14 @@
               <a:buChar char=""/>
             </a:pPr>
             <a:r>
-              <a:rPr b="0" lang="sv-SE" sz="1400" spc="-1" strike="noStrike">
+              <a:rPr lang="sv-SE" sz="1400" b="0" strike="noStrike" spc="-1">
                 <a:latin typeface="Verdana"/>
               </a:rPr>
               <a:t>Fifth Outline Level</a:t>
             </a:r>
-            <a:endParaRPr b="0" lang="sv-SE" sz="1400" spc="-1" strike="noStrike">
-              <a:latin typeface="Verdana"/>
-            </a:endParaRPr>
-          </a:p>
-          <a:p>
-            <a:pPr lvl="5" marL="2592000" indent="-216000">
+          </a:p>
+          <a:p>
+            <a:pPr marL="2592000" lvl="5" indent="-216000">
               <a:spcBef>
                 <a:spcPts val="283"/>
               </a:spcBef>
@@ -1584,17 +1738,14 @@
               <a:buChar char=""/>
             </a:pPr>
             <a:r>
-              <a:rPr b="0" lang="sv-SE" sz="1400" spc="-1" strike="noStrike">
+              <a:rPr lang="sv-SE" sz="1400" b="0" strike="noStrike" spc="-1">
                 <a:latin typeface="Verdana"/>
               </a:rPr>
               <a:t>Sixth Outline Level</a:t>
             </a:r>
-            <a:endParaRPr b="0" lang="sv-SE" sz="1400" spc="-1" strike="noStrike">
-              <a:latin typeface="Verdana"/>
-            </a:endParaRPr>
-          </a:p>
-          <a:p>
-            <a:pPr lvl="6" marL="3024000" indent="-216000">
+          </a:p>
+          <a:p>
+            <a:pPr marL="3024000" lvl="6" indent="-216000">
               <a:spcBef>
                 <a:spcPts val="283"/>
               </a:spcBef>
@@ -1606,14 +1757,11 @@
               <a:buChar char=""/>
             </a:pPr>
             <a:r>
-              <a:rPr b="0" lang="sv-SE" sz="1400" spc="-1" strike="noStrike">
+              <a:rPr lang="sv-SE" sz="1400" b="0" strike="noStrike" spc="-1">
                 <a:latin typeface="Verdana"/>
               </a:rPr>
               <a:t>Seventh Outline Level</a:t>
             </a:r>
-            <a:endParaRPr b="0" lang="sv-SE" sz="1400" spc="-1" strike="noStrike">
-              <a:latin typeface="Verdana"/>
-            </a:endParaRPr>
           </a:p>
         </p:txBody>
       </p:sp>
@@ -1637,15 +1785,16 @@
           </a:prstGeom>
         </p:spPr>
         <p:txBody>
-          <a:bodyPr lIns="0" rIns="0" tIns="0" bIns="0"/>
+          <a:bodyPr lIns="0" tIns="0" rIns="0" bIns="0"/>
+          <a:lstStyle/>
           <a:p>
             <a:fld id="{AB10D14F-98CE-423A-A43F-1B65841F6816}" type="slidenum">
-              <a:rPr b="0" lang="sv-SE" sz="1400" spc="-1" strike="noStrike">
+              <a:rPr lang="sv-SE" sz="1400" b="0" strike="noStrike" spc="-1">
                 <a:latin typeface="Times New Roman"/>
               </a:rPr>
-              <a:t>&lt;number&gt;</a:t>
+              <a:t>‹#›</a:t>
             </a:fld>
-            <a:endParaRPr b="0" lang="sv-SE" sz="1400" spc="-1" strike="noStrike">
+            <a:endParaRPr lang="sv-SE" sz="1400" b="0" strike="noStrike" spc="-1">
               <a:latin typeface="Times New Roman"/>
             </a:endParaRPr>
           </a:p>
@@ -1653,26 +1802,306 @@
       </p:sp>
     </p:spTree>
   </p:cSld>
-  <p:clrMap bg1="lt1" bg2="lt2" tx1="dk1" tx2="dk2" accent1="accent1" accent2="accent2" accent3="accent3" accent4="accent4" accent5="accent5" accent6="accent6" hlink="hlink" folHlink="folHlink"/>
+  <p:clrMap bg1="lt1" tx1="dk1" bg2="lt2" tx2="dk2" accent1="accent1" accent2="accent2" accent3="accent3" accent4="accent4" accent5="accent5" accent6="accent6" hlink="hlink" folHlink="folHlink"/>
   <p:sldLayoutIdLst>
-    <p:sldLayoutId id="2147483649" r:id="rId3"/>
-    <p:sldLayoutId id="2147483650" r:id="rId4"/>
-    <p:sldLayoutId id="2147483651" r:id="rId5"/>
-    <p:sldLayoutId id="2147483652" r:id="rId6"/>
-    <p:sldLayoutId id="2147483653" r:id="rId7"/>
-    <p:sldLayoutId id="2147483654" r:id="rId8"/>
-    <p:sldLayoutId id="2147483655" r:id="rId9"/>
-    <p:sldLayoutId id="2147483656" r:id="rId10"/>
-    <p:sldLayoutId id="2147483657" r:id="rId11"/>
-    <p:sldLayoutId id="2147483658" r:id="rId12"/>
-    <p:sldLayoutId id="2147483659" r:id="rId13"/>
-    <p:sldLayoutId id="2147483660" r:id="rId14"/>
+    <p:sldLayoutId id="2147483649" r:id="rId1"/>
+    <p:sldLayoutId id="2147483650" r:id="rId2"/>
+    <p:sldLayoutId id="2147483651" r:id="rId3"/>
+    <p:sldLayoutId id="2147483652" r:id="rId4"/>
+    <p:sldLayoutId id="2147483653" r:id="rId5"/>
+    <p:sldLayoutId id="2147483654" r:id="rId6"/>
+    <p:sldLayoutId id="2147483655" r:id="rId7"/>
+    <p:sldLayoutId id="2147483656" r:id="rId8"/>
+    <p:sldLayoutId id="2147483657" r:id="rId9"/>
+    <p:sldLayoutId id="2147483658" r:id="rId10"/>
+    <p:sldLayoutId id="2147483659" r:id="rId11"/>
+    <p:sldLayoutId id="2147483660" r:id="rId12"/>
   </p:sldLayoutIdLst>
+  <p:txStyles>
+    <p:titleStyle>
+      <a:lvl1pPr algn="l" defTabSz="914400" rtl="0" eaLnBrk="1" latinLnBrk="0" hangingPunct="1">
+        <a:lnSpc>
+          <a:spcPct val="90000"/>
+        </a:lnSpc>
+        <a:spcBef>
+          <a:spcPct val="0"/>
+        </a:spcBef>
+        <a:buNone/>
+        <a:defRPr sz="4400" kern="1200">
+          <a:solidFill>
+            <a:schemeClr val="tx1"/>
+          </a:solidFill>
+          <a:latin typeface="+mj-lt"/>
+          <a:ea typeface="+mj-ea"/>
+          <a:cs typeface="+mj-cs"/>
+        </a:defRPr>
+      </a:lvl1pPr>
+    </p:titleStyle>
+    <p:bodyStyle>
+      <a:lvl1pPr marL="228600" indent="-228600" algn="l" defTabSz="914400" rtl="0" eaLnBrk="1" latinLnBrk="0" hangingPunct="1">
+        <a:lnSpc>
+          <a:spcPct val="90000"/>
+        </a:lnSpc>
+        <a:spcBef>
+          <a:spcPts val="1000"/>
+        </a:spcBef>
+        <a:buFont typeface="Arial" panose="020B0604020202020204" pitchFamily="34" charset="0"/>
+        <a:buChar char="•"/>
+        <a:defRPr sz="2800" kern="1200">
+          <a:solidFill>
+            <a:schemeClr val="tx1"/>
+          </a:solidFill>
+          <a:latin typeface="+mn-lt"/>
+          <a:ea typeface="+mn-ea"/>
+          <a:cs typeface="+mn-cs"/>
+        </a:defRPr>
+      </a:lvl1pPr>
+      <a:lvl2pPr marL="685800" indent="-228600" algn="l" defTabSz="914400" rtl="0" eaLnBrk="1" latinLnBrk="0" hangingPunct="1">
+        <a:lnSpc>
+          <a:spcPct val="90000"/>
+        </a:lnSpc>
+        <a:spcBef>
+          <a:spcPts val="500"/>
+        </a:spcBef>
+        <a:buFont typeface="Arial" panose="020B0604020202020204" pitchFamily="34" charset="0"/>
+        <a:buChar char="•"/>
+        <a:defRPr sz="2400" kern="1200">
+          <a:solidFill>
+            <a:schemeClr val="tx1"/>
+          </a:solidFill>
+          <a:latin typeface="+mn-lt"/>
+          <a:ea typeface="+mn-ea"/>
+          <a:cs typeface="+mn-cs"/>
+        </a:defRPr>
+      </a:lvl2pPr>
+      <a:lvl3pPr marL="1143000" indent="-228600" algn="l" defTabSz="914400" rtl="0" eaLnBrk="1" latinLnBrk="0" hangingPunct="1">
+        <a:lnSpc>
+          <a:spcPct val="90000"/>
+        </a:lnSpc>
+        <a:spcBef>
+          <a:spcPts val="500"/>
+        </a:spcBef>
+        <a:buFont typeface="Arial" panose="020B0604020202020204" pitchFamily="34" charset="0"/>
+        <a:buChar char="•"/>
+        <a:defRPr sz="2000" kern="1200">
+          <a:solidFill>
+            <a:schemeClr val="tx1"/>
+          </a:solidFill>
+          <a:latin typeface="+mn-lt"/>
+          <a:ea typeface="+mn-ea"/>
+          <a:cs typeface="+mn-cs"/>
+        </a:defRPr>
+      </a:lvl3pPr>
+      <a:lvl4pPr marL="1600200" indent="-228600" algn="l" defTabSz="914400" rtl="0" eaLnBrk="1" latinLnBrk="0" hangingPunct="1">
+        <a:lnSpc>
+          <a:spcPct val="90000"/>
+        </a:lnSpc>
+        <a:spcBef>
+          <a:spcPts val="500"/>
+        </a:spcBef>
+        <a:buFont typeface="Arial" panose="020B0604020202020204" pitchFamily="34" charset="0"/>
+        <a:buChar char="•"/>
+        <a:defRPr sz="1800" kern="1200">
+          <a:solidFill>
+            <a:schemeClr val="tx1"/>
+          </a:solidFill>
+          <a:latin typeface="+mn-lt"/>
+          <a:ea typeface="+mn-ea"/>
+          <a:cs typeface="+mn-cs"/>
+        </a:defRPr>
+      </a:lvl4pPr>
+      <a:lvl5pPr marL="2057400" indent="-228600" algn="l" defTabSz="914400" rtl="0" eaLnBrk="1" latinLnBrk="0" hangingPunct="1">
+        <a:lnSpc>
+          <a:spcPct val="90000"/>
+        </a:lnSpc>
+        <a:spcBef>
+          <a:spcPts val="500"/>
+        </a:spcBef>
+        <a:buFont typeface="Arial" panose="020B0604020202020204" pitchFamily="34" charset="0"/>
+        <a:buChar char="•"/>
+        <a:defRPr sz="1800" kern="1200">
+          <a:solidFill>
+            <a:schemeClr val="tx1"/>
+          </a:solidFill>
+          <a:latin typeface="+mn-lt"/>
+          <a:ea typeface="+mn-ea"/>
+          <a:cs typeface="+mn-cs"/>
+        </a:defRPr>
+      </a:lvl5pPr>
+      <a:lvl6pPr marL="2514600" indent="-228600" algn="l" defTabSz="914400" rtl="0" eaLnBrk="1" latinLnBrk="0" hangingPunct="1">
+        <a:lnSpc>
+          <a:spcPct val="90000"/>
+        </a:lnSpc>
+        <a:spcBef>
+          <a:spcPts val="500"/>
+        </a:spcBef>
+        <a:buFont typeface="Arial" panose="020B0604020202020204" pitchFamily="34" charset="0"/>
+        <a:buChar char="•"/>
+        <a:defRPr sz="1800" kern="1200">
+          <a:solidFill>
+            <a:schemeClr val="tx1"/>
+          </a:solidFill>
+          <a:latin typeface="+mn-lt"/>
+          <a:ea typeface="+mn-ea"/>
+          <a:cs typeface="+mn-cs"/>
+        </a:defRPr>
+      </a:lvl6pPr>
+      <a:lvl7pPr marL="2971800" indent="-228600" algn="l" defTabSz="914400" rtl="0" eaLnBrk="1" latinLnBrk="0" hangingPunct="1">
+        <a:lnSpc>
+          <a:spcPct val="90000"/>
+        </a:lnSpc>
+        <a:spcBef>
+          <a:spcPts val="500"/>
+        </a:spcBef>
+        <a:buFont typeface="Arial" panose="020B0604020202020204" pitchFamily="34" charset="0"/>
+        <a:buChar char="•"/>
+        <a:defRPr sz="1800" kern="1200">
+          <a:solidFill>
+            <a:schemeClr val="tx1"/>
+          </a:solidFill>
+          <a:latin typeface="+mn-lt"/>
+          <a:ea typeface="+mn-ea"/>
+          <a:cs typeface="+mn-cs"/>
+        </a:defRPr>
+      </a:lvl7pPr>
+      <a:lvl8pPr marL="3429000" indent="-228600" algn="l" defTabSz="914400" rtl="0" eaLnBrk="1" latinLnBrk="0" hangingPunct="1">
+        <a:lnSpc>
+          <a:spcPct val="90000"/>
+        </a:lnSpc>
+        <a:spcBef>
+          <a:spcPts val="500"/>
+        </a:spcBef>
+        <a:buFont typeface="Arial" panose="020B0604020202020204" pitchFamily="34" charset="0"/>
+        <a:buChar char="•"/>
+        <a:defRPr sz="1800" kern="1200">
+          <a:solidFill>
+            <a:schemeClr val="tx1"/>
+          </a:solidFill>
+          <a:latin typeface="+mn-lt"/>
+          <a:ea typeface="+mn-ea"/>
+          <a:cs typeface="+mn-cs"/>
+        </a:defRPr>
+      </a:lvl8pPr>
+      <a:lvl9pPr marL="3886200" indent="-228600" algn="l" defTabSz="914400" rtl="0" eaLnBrk="1" latinLnBrk="0" hangingPunct="1">
+        <a:lnSpc>
+          <a:spcPct val="90000"/>
+        </a:lnSpc>
+        <a:spcBef>
+          <a:spcPts val="500"/>
+        </a:spcBef>
+        <a:buFont typeface="Arial" panose="020B0604020202020204" pitchFamily="34" charset="0"/>
+        <a:buChar char="•"/>
+        <a:defRPr sz="1800" kern="1200">
+          <a:solidFill>
+            <a:schemeClr val="tx1"/>
+          </a:solidFill>
+          <a:latin typeface="+mn-lt"/>
+          <a:ea typeface="+mn-ea"/>
+          <a:cs typeface="+mn-cs"/>
+        </a:defRPr>
+      </a:lvl9pPr>
+    </p:bodyStyle>
+    <p:otherStyle>
+      <a:defPPr>
+        <a:defRPr lang="sv-SE"/>
+      </a:defPPr>
+      <a:lvl1pPr marL="0" algn="l" defTabSz="914400" rtl="0" eaLnBrk="1" latinLnBrk="0" hangingPunct="1">
+        <a:defRPr sz="1800" kern="1200">
+          <a:solidFill>
+            <a:schemeClr val="tx1"/>
+          </a:solidFill>
+          <a:latin typeface="+mn-lt"/>
+          <a:ea typeface="+mn-ea"/>
+          <a:cs typeface="+mn-cs"/>
+        </a:defRPr>
+      </a:lvl1pPr>
+      <a:lvl2pPr marL="457200" algn="l" defTabSz="914400" rtl="0" eaLnBrk="1" latinLnBrk="0" hangingPunct="1">
+        <a:defRPr sz="1800" kern="1200">
+          <a:solidFill>
+            <a:schemeClr val="tx1"/>
+          </a:solidFill>
+          <a:latin typeface="+mn-lt"/>
+          <a:ea typeface="+mn-ea"/>
+          <a:cs typeface="+mn-cs"/>
+        </a:defRPr>
+      </a:lvl2pPr>
+      <a:lvl3pPr marL="914400" algn="l" defTabSz="914400" rtl="0" eaLnBrk="1" latinLnBrk="0" hangingPunct="1">
+        <a:defRPr sz="1800" kern="1200">
+          <a:solidFill>
+            <a:schemeClr val="tx1"/>
+          </a:solidFill>
+          <a:latin typeface="+mn-lt"/>
+          <a:ea typeface="+mn-ea"/>
+          <a:cs typeface="+mn-cs"/>
+        </a:defRPr>
+      </a:lvl3pPr>
+      <a:lvl4pPr marL="1371600" algn="l" defTabSz="914400" rtl="0" eaLnBrk="1" latinLnBrk="0" hangingPunct="1">
+        <a:defRPr sz="1800" kern="1200">
+          <a:solidFill>
+            <a:schemeClr val="tx1"/>
+          </a:solidFill>
+          <a:latin typeface="+mn-lt"/>
+          <a:ea typeface="+mn-ea"/>
+          <a:cs typeface="+mn-cs"/>
+        </a:defRPr>
+      </a:lvl4pPr>
+      <a:lvl5pPr marL="1828800" algn="l" defTabSz="914400" rtl="0" eaLnBrk="1" latinLnBrk="0" hangingPunct="1">
+        <a:defRPr sz="1800" kern="1200">
+          <a:solidFill>
+            <a:schemeClr val="tx1"/>
+          </a:solidFill>
+          <a:latin typeface="+mn-lt"/>
+          <a:ea typeface="+mn-ea"/>
+          <a:cs typeface="+mn-cs"/>
+        </a:defRPr>
+      </a:lvl5pPr>
+      <a:lvl6pPr marL="2286000" algn="l" defTabSz="914400" rtl="0" eaLnBrk="1" latinLnBrk="0" hangingPunct="1">
+        <a:defRPr sz="1800" kern="1200">
+          <a:solidFill>
+            <a:schemeClr val="tx1"/>
+          </a:solidFill>
+          <a:latin typeface="+mn-lt"/>
+          <a:ea typeface="+mn-ea"/>
+          <a:cs typeface="+mn-cs"/>
+        </a:defRPr>
+      </a:lvl6pPr>
+      <a:lvl7pPr marL="2743200" algn="l" defTabSz="914400" rtl="0" eaLnBrk="1" latinLnBrk="0" hangingPunct="1">
+        <a:defRPr sz="1800" kern="1200">
+          <a:solidFill>
+            <a:schemeClr val="tx1"/>
+          </a:solidFill>
+          <a:latin typeface="+mn-lt"/>
+          <a:ea typeface="+mn-ea"/>
+          <a:cs typeface="+mn-cs"/>
+        </a:defRPr>
+      </a:lvl7pPr>
+      <a:lvl8pPr marL="3200400" algn="l" defTabSz="914400" rtl="0" eaLnBrk="1" latinLnBrk="0" hangingPunct="1">
+        <a:defRPr sz="1800" kern="1200">
+          <a:solidFill>
+            <a:schemeClr val="tx1"/>
+          </a:solidFill>
+          <a:latin typeface="+mn-lt"/>
+          <a:ea typeface="+mn-ea"/>
+          <a:cs typeface="+mn-cs"/>
+        </a:defRPr>
+      </a:lvl8pPr>
+      <a:lvl9pPr marL="3657600" algn="l" defTabSz="914400" rtl="0" eaLnBrk="1" latinLnBrk="0" hangingPunct="1">
+        <a:defRPr sz="1800" kern="1200">
+          <a:solidFill>
+            <a:schemeClr val="tx1"/>
+          </a:solidFill>
+          <a:latin typeface="+mn-lt"/>
+          <a:ea typeface="+mn-ea"/>
+          <a:cs typeface="+mn-cs"/>
+        </a:defRPr>
+      </a:lvl9pPr>
+    </p:otherStyle>
+  </p:txStyles>
 </p:sldMaster>
 </file>
 
 <file path=ppt/slides/slide1.xml><?xml version="1.0" encoding="utf-8"?>
-<p:sld xmlns:a="http://schemas.openxmlformats.org/drawingml/2006/main" xmlns:p="http://schemas.openxmlformats.org/presentationml/2006/main" xmlns:r="http://schemas.openxmlformats.org/officeDocument/2006/relationships" xmlns:p14="http://schemas.microsoft.com/office/powerpoint/2010/main" xmlns:p15="http://schemas.microsoft.com/office/powerpoint/2012/main" xmlns:mc="http://schemas.openxmlformats.org/markup-compatibility/2006">
+<p:sld xmlns:a="http://schemas.openxmlformats.org/drawingml/2006/main" xmlns:r="http://schemas.openxmlformats.org/officeDocument/2006/relationships" xmlns:p="http://schemas.openxmlformats.org/presentationml/2006/main">
   <p:cSld>
     <p:spTree>
       <p:nvGrpSpPr>
@@ -1690,90 +2119,139 @@
       </p:grpSpPr>
       <p:sp>
         <p:nvSpPr>
-          <p:cNvPr id="39" name="TextShape 1"/>
-          <p:cNvSpPr txBox="1"/>
-          <p:nvPr/>
-        </p:nvSpPr>
-        <p:spPr>
-          <a:xfrm>
-            <a:off x="468360" y="1080000"/>
-            <a:ext cx="9071640" cy="1224000"/>
-          </a:xfrm>
-          <a:prstGeom prst="rect">
-            <a:avLst/>
-          </a:prstGeom>
-          <a:noFill/>
-          <a:ln>
-            <a:noFill/>
-          </a:ln>
-        </p:spPr>
-        <p:txBody>
-          <a:bodyPr lIns="0" rIns="0" tIns="0" bIns="0" anchor="ctr"/>
-          <a:p>
-            <a:pPr algn="ctr"/>
-            <a:endParaRPr b="1" lang="sv-SE" sz="2200" spc="-1" strike="noStrike">
+          <p:cNvPr id="4" name="Rubrik 3">
+            <a:extLst>
+              <a:ext uri="{FF2B5EF4-FFF2-40B4-BE49-F238E27FC236}">
+                <a16:creationId xmlns:a16="http://schemas.microsoft.com/office/drawing/2014/main" id="{6802CD9A-C445-4A9F-BA04-0821F68558FC}"/>
+              </a:ext>
+            </a:extLst>
+          </p:cNvPr>
+          <p:cNvSpPr>
+            <a:spLocks noGrp="1"/>
+          </p:cNvSpPr>
+          <p:nvPr>
+            <p:ph type="title"/>
+          </p:nvPr>
+        </p:nvSpPr>
+        <p:spPr>
+          <a:xfrm>
+            <a:off x="504000" y="653283"/>
+            <a:ext cx="9071640" cy="946440"/>
+          </a:xfrm>
+        </p:spPr>
+        <p:txBody>
+          <a:bodyPr/>
+          <a:lstStyle/>
+          <a:p>
+            <a:endParaRPr lang="sv-SE" sz="1800" b="1" dirty="0">
               <a:solidFill>
-                <a:srgbClr val="656f6f"/>
+                <a:srgbClr val="656F6F"/>
               </a:solidFill>
-              <a:latin typeface="Verdana"/>
-            </a:endParaRPr>
-          </a:p>
-        </p:txBody>
-      </p:sp>
-      <p:sp>
-        <p:nvSpPr>
-          <p:cNvPr id="40" name="TextShape 2"/>
-          <p:cNvSpPr txBox="1"/>
-          <p:nvPr/>
-        </p:nvSpPr>
-        <p:spPr>
-          <a:xfrm>
-            <a:off x="4284000" y="4680000"/>
-            <a:ext cx="1364760" cy="584280"/>
-          </a:xfrm>
-          <a:prstGeom prst="rect">
-            <a:avLst/>
-          </a:prstGeom>
-          <a:noFill/>
-          <a:ln>
-            <a:noFill/>
-          </a:ln>
-        </p:spPr>
-        <p:txBody>
-          <a:bodyPr lIns="90000" rIns="90000" tIns="45000" bIns="45000"/>
-          <a:p>
-            <a:pPr algn="ctr"/>
+              <a:latin typeface="Verdana" panose="020B0604030504040204" pitchFamily="34" charset="0"/>
+              <a:ea typeface="Verdana" panose="020B0604030504040204" pitchFamily="34" charset="0"/>
+            </a:endParaRPr>
+          </a:p>
+        </p:txBody>
+      </p:sp>
+      <p:sp>
+        <p:nvSpPr>
+          <p:cNvPr id="5" name="Platshållare för text 4">
+            <a:extLst>
+              <a:ext uri="{FF2B5EF4-FFF2-40B4-BE49-F238E27FC236}">
+                <a16:creationId xmlns:a16="http://schemas.microsoft.com/office/drawing/2014/main" id="{F0C3B7CA-FAA7-4FDC-A580-EB2F5540E94D}"/>
+              </a:ext>
+            </a:extLst>
+          </p:cNvPr>
+          <p:cNvSpPr>
+            <a:spLocks noGrp="1"/>
+          </p:cNvSpPr>
+          <p:nvPr>
+            <p:ph type="body"/>
+          </p:nvPr>
+        </p:nvSpPr>
+        <p:spPr>
+          <a:xfrm>
+            <a:off x="504000" y="1959723"/>
+            <a:ext cx="9071640" cy="360000"/>
+          </a:xfrm>
+        </p:spPr>
+        <p:txBody>
+          <a:bodyPr>
+            <a:normAutofit/>
+          </a:bodyPr>
+          <a:lstStyle/>
+          <a:p>
+            <a:pPr marL="0" indent="0">
+              <a:buNone/>
+            </a:pPr>
             <a:r>
-              <a:rPr b="0" lang="sv-SE" sz="1600" spc="-1" strike="noStrike">
-                <a:latin typeface="Verdana"/>
+              <a:rPr lang="sv-SE" sz="1800" dirty="0" err="1">
+                <a:solidFill>
+                  <a:srgbClr val="656F6F"/>
+                </a:solidFill>
               </a:rPr>
               <a:t>Author</a:t>
             </a:r>
-            <a:endParaRPr b="0" lang="sv-SE" sz="1600" spc="-1" strike="noStrike">
-              <a:latin typeface="Arial"/>
-            </a:endParaRPr>
-          </a:p>
-          <a:p>
-            <a:pPr algn="ctr"/>
+            <a:endParaRPr lang="sv-SE" sz="1800" dirty="0">
+              <a:solidFill>
+                <a:srgbClr val="656F6F"/>
+              </a:solidFill>
+            </a:endParaRPr>
+          </a:p>
+        </p:txBody>
+      </p:sp>
+      <p:sp>
+        <p:nvSpPr>
+          <p:cNvPr id="11" name="Platshållare för text 4">
+            <a:extLst>
+              <a:ext uri="{FF2B5EF4-FFF2-40B4-BE49-F238E27FC236}">
+                <a16:creationId xmlns:a16="http://schemas.microsoft.com/office/drawing/2014/main" id="{D39DBB5B-561B-4145-85B0-03DFA6A84F59}"/>
+              </a:ext>
+            </a:extLst>
+          </p:cNvPr>
+          <p:cNvSpPr>
+            <a:spLocks noGrp="1"/>
+          </p:cNvSpPr>
+          <p:nvPr>
+            <p:ph type="body"/>
+          </p:nvPr>
+        </p:nvSpPr>
+        <p:spPr>
+          <a:xfrm>
+            <a:off x="483476" y="2475275"/>
+            <a:ext cx="9071640" cy="360000"/>
+          </a:xfrm>
+        </p:spPr>
+        <p:txBody>
+          <a:bodyPr>
+            <a:normAutofit/>
+          </a:bodyPr>
+          <a:lstStyle/>
+          <a:p>
+            <a:pPr marL="0" indent="0">
+              <a:buNone/>
+            </a:pPr>
             <a:r>
-              <a:rPr b="0" lang="sv-SE" sz="1600" spc="-1" strike="noStrike">
-                <a:latin typeface="Verdana"/>
+              <a:rPr lang="sv-SE" sz="1800" dirty="0">
+                <a:solidFill>
+                  <a:srgbClr val="656F6F"/>
+                </a:solidFill>
               </a:rPr>
-              <a:t>1 Aug 2019</a:t>
+              <a:t>Date</a:t>
             </a:r>
-            <a:endParaRPr b="0" lang="sv-SE" sz="1600" spc="-1" strike="noStrike">
-              <a:latin typeface="Arial"/>
-            </a:endParaRPr>
           </a:p>
         </p:txBody>
       </p:sp>
     </p:spTree>
   </p:cSld>
+  <p:clrMapOvr>
+    <a:masterClrMapping/>
+  </p:clrMapOvr>
 </p:sld>
 </file>
 
 <file path=ppt/slides/slide2.xml><?xml version="1.0" encoding="utf-8"?>
-<p:sld xmlns:a="http://schemas.openxmlformats.org/drawingml/2006/main" xmlns:p="http://schemas.openxmlformats.org/presentationml/2006/main" xmlns:r="http://schemas.openxmlformats.org/officeDocument/2006/relationships" xmlns:p14="http://schemas.microsoft.com/office/powerpoint/2010/main" xmlns:p15="http://schemas.microsoft.com/office/powerpoint/2012/main" xmlns:mc="http://schemas.openxmlformats.org/markup-compatibility/2006">
+<p:sld xmlns:a="http://schemas.openxmlformats.org/drawingml/2006/main" xmlns:r="http://schemas.openxmlformats.org/officeDocument/2006/relationships" xmlns:p="http://schemas.openxmlformats.org/presentationml/2006/main">
   <p:cSld>
     <p:spTree>
       <p:nvGrpSpPr>
@@ -1791,67 +2269,84 @@
       </p:grpSpPr>
       <p:sp>
         <p:nvSpPr>
-          <p:cNvPr id="41" name="TextShape 1"/>
-          <p:cNvSpPr txBox="1"/>
-          <p:nvPr/>
-        </p:nvSpPr>
-        <p:spPr>
-          <a:xfrm>
-            <a:off x="504000" y="298080"/>
+          <p:cNvPr id="3" name="Platshållare för text 2">
+            <a:extLst>
+              <a:ext uri="{FF2B5EF4-FFF2-40B4-BE49-F238E27FC236}">
+                <a16:creationId xmlns:a16="http://schemas.microsoft.com/office/drawing/2014/main" id="{CB3DDA14-C7EC-46A0-B9E7-9BEEB34D1F0E}"/>
+              </a:ext>
+            </a:extLst>
+          </p:cNvPr>
+          <p:cNvSpPr>
+            <a:spLocks noGrp="1"/>
+          </p:cNvSpPr>
+          <p:nvPr>
+            <p:ph type="body"/>
+          </p:nvPr>
+        </p:nvSpPr>
+        <p:spPr>
+          <a:xfrm>
+            <a:off x="504492" y="1736504"/>
+            <a:ext cx="9071640" cy="3288240"/>
+          </a:xfrm>
+        </p:spPr>
+        <p:txBody>
+          <a:bodyPr anchor="t">
+            <a:normAutofit/>
+          </a:bodyPr>
+          <a:lstStyle/>
+          <a:p>
+            <a:pPr marL="285750" indent="-285750">
+              <a:buFont typeface="Arial" panose="020B0604020202020204" pitchFamily="34" charset="0"/>
+              <a:buChar char="•"/>
+            </a:pPr>
+            <a:endParaRPr lang="sv-SE" sz="1800" dirty="0"/>
+          </a:p>
+        </p:txBody>
+      </p:sp>
+      <p:sp>
+        <p:nvSpPr>
+          <p:cNvPr id="4" name="Rubrik 1">
+            <a:extLst>
+              <a:ext uri="{FF2B5EF4-FFF2-40B4-BE49-F238E27FC236}">
+                <a16:creationId xmlns:a16="http://schemas.microsoft.com/office/drawing/2014/main" id="{BAE50015-14FC-4E7D-94E7-9604AB9F19F1}"/>
+              </a:ext>
+            </a:extLst>
+          </p:cNvPr>
+          <p:cNvSpPr>
+            <a:spLocks noGrp="1"/>
+          </p:cNvSpPr>
+          <p:nvPr>
+            <p:ph type="title"/>
+          </p:nvPr>
+        </p:nvSpPr>
+        <p:spPr>
+          <a:xfrm>
+            <a:off x="504492" y="645806"/>
             <a:ext cx="9071640" cy="946440"/>
           </a:xfrm>
-          <a:prstGeom prst="rect">
-            <a:avLst/>
-          </a:prstGeom>
-          <a:noFill/>
-          <a:ln>
-            <a:noFill/>
-          </a:ln>
-        </p:spPr>
-        <p:txBody>
-          <a:bodyPr lIns="0" rIns="0" tIns="0" bIns="0" anchor="ctr"/>
-          <a:p>
-            <a:endParaRPr b="1" lang="sv-SE" sz="2200" spc="-1" strike="noStrike">
+        </p:spPr>
+        <p:txBody>
+          <a:bodyPr/>
+          <a:lstStyle/>
+          <a:p>
+            <a:endParaRPr lang="sv-SE" sz="1800" b="1" dirty="0">
               <a:solidFill>
-                <a:srgbClr val="656f6f"/>
+                <a:srgbClr val="656F6F"/>
               </a:solidFill>
-              <a:latin typeface="Verdana"/>
-            </a:endParaRPr>
-          </a:p>
-        </p:txBody>
-      </p:sp>
-      <p:sp>
-        <p:nvSpPr>
-          <p:cNvPr id="42" name="TextShape 2"/>
-          <p:cNvSpPr txBox="1"/>
-          <p:nvPr/>
-        </p:nvSpPr>
-        <p:spPr>
-          <a:xfrm>
-            <a:off x="504000" y="1326600"/>
-            <a:ext cx="9071640" cy="3288240"/>
-          </a:xfrm>
-          <a:prstGeom prst="rect">
-            <a:avLst/>
-          </a:prstGeom>
-          <a:noFill/>
-          <a:ln>
-            <a:noFill/>
-          </a:ln>
-        </p:spPr>
-        <p:txBody>
-          <a:bodyPr lIns="0" rIns="0" tIns="0" bIns="0">
-            <a:normAutofit/>
-          </a:bodyPr>
-          <a:p>
-            <a:endParaRPr b="1" lang="sv-SE" sz="1800" spc="-1" strike="noStrike">
-              <a:latin typeface="Verdana"/>
             </a:endParaRPr>
           </a:p>
         </p:txBody>
       </p:sp>
     </p:spTree>
+    <p:extLst>
+      <p:ext uri="{BB962C8B-B14F-4D97-AF65-F5344CB8AC3E}">
+        <p14:creationId xmlns:p14="http://schemas.microsoft.com/office/powerpoint/2010/main" val="2453187882"/>
+      </p:ext>
+    </p:extLst>
   </p:cSld>
+  <p:clrMapOvr>
+    <a:masterClrMapping/>
+  </p:clrMapOvr>
 </p:sld>
 </file>
 
@@ -1866,44 +2361,44 @@
         <a:sysClr val="window" lastClr="FFFFFF"/>
       </a:lt1>
       <a:dk2>
-        <a:srgbClr val="1f497d"/>
+        <a:srgbClr val="1F497D"/>
       </a:dk2>
       <a:lt2>
-        <a:srgbClr val="eeece1"/>
+        <a:srgbClr val="EEECE1"/>
       </a:lt2>
       <a:accent1>
-        <a:srgbClr val="4f81bd"/>
+        <a:srgbClr val="4F81BD"/>
       </a:accent1>
       <a:accent2>
-        <a:srgbClr val="c0504d"/>
+        <a:srgbClr val="C0504D"/>
       </a:accent2>
       <a:accent3>
-        <a:srgbClr val="9bbb59"/>
+        <a:srgbClr val="9BBB59"/>
       </a:accent3>
       <a:accent4>
-        <a:srgbClr val="8064a2"/>
+        <a:srgbClr val="8064A2"/>
       </a:accent4>
       <a:accent5>
-        <a:srgbClr val="4bacc6"/>
+        <a:srgbClr val="4BACC6"/>
       </a:accent5>
       <a:accent6>
-        <a:srgbClr val="f79646"/>
+        <a:srgbClr val="F79646"/>
       </a:accent6>
       <a:hlink>
-        <a:srgbClr val="0000ff"/>
+        <a:srgbClr val="0000FF"/>
       </a:hlink>
       <a:folHlink>
         <a:srgbClr val="800080"/>
       </a:folHlink>
     </a:clrScheme>
-    <a:fontScheme name="Office">
+    <a:fontScheme name="Anpassat 2">
       <a:majorFont>
-        <a:latin typeface="Arial"/>
+        <a:latin typeface="Verdana"/>
         <a:ea typeface="DejaVu Sans"/>
         <a:cs typeface="DejaVu Sans"/>
       </a:majorFont>
       <a:minorFont>
-        <a:latin typeface="Arial"/>
+        <a:latin typeface="Verdana"/>
         <a:ea typeface="DejaVu Sans"/>
         <a:cs typeface="DejaVu Sans"/>
       </a:minorFont>
@@ -2075,5 +2570,7 @@
       </a:bgFillStyleLst>
     </a:fmtScheme>
   </a:themeElements>
+  <a:objectDefaults/>
+  <a:extraClrSchemeLst/>
 </a:theme>
 </file>
</xml_diff>